<commit_message>
Further updates to Session 2
</commit_message>
<xml_diff>
--- a/Session 2 - Matrices and image processing/MATLAB Session 2.pptx
+++ b/Session 2 - Matrices and image processing/MATLAB Session 2.pptx
@@ -5,7 +5,7 @@
     <p:sldMasterId id="2147483678" r:id="rId1"/>
   </p:sldMasterIdLst>
   <p:notesMasterIdLst>
-    <p:notesMasterId r:id="rId19"/>
+    <p:notesMasterId r:id="rId24"/>
   </p:notesMasterIdLst>
   <p:sldIdLst>
     <p:sldId id="316" r:id="rId2"/>
@@ -15,16 +15,21 @@
     <p:sldId id="360" r:id="rId6"/>
     <p:sldId id="361" r:id="rId7"/>
     <p:sldId id="352" r:id="rId8"/>
-    <p:sldId id="365" r:id="rId9"/>
-    <p:sldId id="354" r:id="rId10"/>
-    <p:sldId id="353" r:id="rId11"/>
-    <p:sldId id="363" r:id="rId12"/>
-    <p:sldId id="364" r:id="rId13"/>
-    <p:sldId id="362" r:id="rId14"/>
-    <p:sldId id="355" r:id="rId15"/>
-    <p:sldId id="356" r:id="rId16"/>
-    <p:sldId id="358" r:id="rId17"/>
-    <p:sldId id="357" r:id="rId18"/>
+    <p:sldId id="367" r:id="rId9"/>
+    <p:sldId id="370" r:id="rId10"/>
+    <p:sldId id="369" r:id="rId11"/>
+    <p:sldId id="368" r:id="rId12"/>
+    <p:sldId id="366" r:id="rId13"/>
+    <p:sldId id="365" r:id="rId14"/>
+    <p:sldId id="354" r:id="rId15"/>
+    <p:sldId id="353" r:id="rId16"/>
+    <p:sldId id="363" r:id="rId17"/>
+    <p:sldId id="364" r:id="rId18"/>
+    <p:sldId id="362" r:id="rId19"/>
+    <p:sldId id="355" r:id="rId20"/>
+    <p:sldId id="356" r:id="rId21"/>
+    <p:sldId id="358" r:id="rId22"/>
+    <p:sldId id="357" r:id="rId23"/>
   </p:sldIdLst>
   <p:sldSz cx="12192000" cy="6858000"/>
   <p:notesSz cx="6669088" cy="9926638"/>
@@ -897,10 +902,22 @@
         <p:txBody>
           <a:bodyPr/>
           <a:lstStyle>
+            <a:lvl1pPr>
+              <a:defRPr sz="2800"/>
+            </a:lvl1pPr>
+            <a:lvl2pPr>
+              <a:defRPr sz="2400"/>
+            </a:lvl2pPr>
+            <a:lvl3pPr>
+              <a:defRPr sz="2000"/>
+            </a:lvl3pPr>
+            <a:lvl4pPr>
+              <a:defRPr sz="1800"/>
+            </a:lvl4pPr>
             <a:lvl5pPr>
               <a:buFont typeface="Arial" pitchFamily="34" charset="0"/>
               <a:buChar char="­"/>
-              <a:defRPr/>
+              <a:defRPr sz="1800"/>
             </a:lvl5pPr>
           </a:lstStyle>
           <a:p>
@@ -993,10 +1010,22 @@
         <p:txBody>
           <a:bodyPr/>
           <a:lstStyle>
+            <a:lvl1pPr>
+              <a:defRPr sz="2800"/>
+            </a:lvl1pPr>
+            <a:lvl2pPr>
+              <a:defRPr sz="2400"/>
+            </a:lvl2pPr>
+            <a:lvl3pPr>
+              <a:defRPr sz="2000"/>
+            </a:lvl3pPr>
+            <a:lvl4pPr>
+              <a:defRPr sz="1800"/>
+            </a:lvl4pPr>
             <a:lvl5pPr>
               <a:buFont typeface="Arial" pitchFamily="34" charset="0"/>
               <a:buChar char="­"/>
-              <a:defRPr/>
+              <a:defRPr sz="1800"/>
             </a:lvl5pPr>
           </a:lstStyle>
           <a:p>
@@ -1134,7 +1163,7 @@
         <p:spPr>
           <a:xfrm>
             <a:off x="609600" y="1412784"/>
-            <a:ext cx="5384800" cy="4525963"/>
+            <a:ext cx="5486400" cy="4525963"/>
           </a:xfrm>
           <a:prstGeom prst="rect">
             <a:avLst/>
@@ -1221,8 +1250,8 @@
         </p:nvSpPr>
         <p:spPr>
           <a:xfrm>
-            <a:off x="6197600" y="1412784"/>
-            <a:ext cx="5384800" cy="4525963"/>
+            <a:off x="6096000" y="1412784"/>
+            <a:ext cx="5486400" cy="4525963"/>
           </a:xfrm>
           <a:prstGeom prst="rect">
             <a:avLst/>
@@ -1262,38 +1291,38 @@
           <a:p>
             <a:pPr lvl="0"/>
             <a:r>
-              <a:rPr lang="en-US"/>
+              <a:rPr lang="en-US" dirty="0"/>
               <a:t>Click to edit Master text styles</a:t>
             </a:r>
           </a:p>
           <a:p>
             <a:pPr lvl="1"/>
             <a:r>
-              <a:rPr lang="en-US"/>
+              <a:rPr lang="en-US" dirty="0"/>
               <a:t>Second level</a:t>
             </a:r>
           </a:p>
           <a:p>
             <a:pPr lvl="2"/>
             <a:r>
-              <a:rPr lang="en-US"/>
+              <a:rPr lang="en-US" dirty="0"/>
               <a:t>Third level</a:t>
             </a:r>
           </a:p>
           <a:p>
             <a:pPr lvl="3"/>
             <a:r>
-              <a:rPr lang="en-US"/>
+              <a:rPr lang="en-US" dirty="0"/>
               <a:t>Fourth level</a:t>
             </a:r>
           </a:p>
           <a:p>
             <a:pPr lvl="4"/>
             <a:r>
-              <a:rPr lang="en-US"/>
+              <a:rPr lang="en-US" dirty="0"/>
               <a:t>Fifth level</a:t>
             </a:r>
-            <a:endParaRPr lang="en-GB"/>
+            <a:endParaRPr lang="en-GB" dirty="0"/>
           </a:p>
         </p:txBody>
       </p:sp>
@@ -2332,7 +2361,7 @@
             </a:br>
             <a:r>
               <a:rPr lang="en-GB" sz="2800" dirty="0"/>
-              <a:t>Session 1: Introduction</a:t>
+              <a:t>Session 2: Matrices and image processing</a:t>
             </a:r>
             <a:endParaRPr lang="en-GB" dirty="0"/>
           </a:p>
@@ -2403,7 +2432,7 @@
           <a:p>
             <a:r>
               <a:rPr lang="en-GB" dirty="0"/>
-              <a:t>Optimising code</a:t>
+              <a:t>Creating matrices</a:t>
             </a:r>
           </a:p>
         </p:txBody>
@@ -2430,36 +2459,25 @@
           <a:lstStyle/>
           <a:p>
             <a:r>
-              <a:rPr lang="en-GB" dirty="0"/>
-              <a:t>Tic toc</a:t>
-            </a:r>
-          </a:p>
-          <a:p>
-            <a:pPr lvl="1"/>
-            <a:r>
-              <a:rPr lang="en-GB" dirty="0"/>
-              <a:t>Demo</a:t>
-            </a:r>
-          </a:p>
-          <a:p>
-            <a:r>
-              <a:rPr lang="en-GB" dirty="0"/>
-              <a:t>Profiler</a:t>
-            </a:r>
-          </a:p>
-          <a:p>
-            <a:pPr lvl="1"/>
-            <a:r>
-              <a:rPr lang="en-GB" dirty="0"/>
-              <a:t>Demo</a:t>
-            </a:r>
+              <a:rPr lang="en-GB" sz="2800" dirty="0">
+                <a:solidFill>
+                  <a:srgbClr val="FF0000"/>
+                </a:solidFill>
+              </a:rPr>
+              <a:t>[Have them do an exercise]</a:t>
+            </a:r>
+            <a:endParaRPr lang="en-GB" dirty="0">
+              <a:solidFill>
+                <a:srgbClr val="FF0000"/>
+              </a:solidFill>
+            </a:endParaRPr>
           </a:p>
         </p:txBody>
       </p:sp>
     </p:spTree>
     <p:extLst>
       <p:ext uri="{BB962C8B-B14F-4D97-AF65-F5344CB8AC3E}">
-        <p14:creationId xmlns:p14="http://schemas.microsoft.com/office/powerpoint/2010/main" val="1218872746"/>
+        <p14:creationId xmlns:p14="http://schemas.microsoft.com/office/powerpoint/2010/main" val="3472984134"/>
       </p:ext>
     </p:extLst>
   </p:cSld>
@@ -2491,7 +2509,7 @@
           <p:cNvPr id="2" name="Title 1">
             <a:extLst>
               <a:ext uri="{FF2B5EF4-FFF2-40B4-BE49-F238E27FC236}">
-                <a16:creationId xmlns:a16="http://schemas.microsoft.com/office/drawing/2014/main" id="{8EEF9218-B50A-424A-A99D-57BA08F4A8E3}"/>
+                <a16:creationId xmlns:a16="http://schemas.microsoft.com/office/drawing/2014/main" id="{8B0C5865-E132-43F0-814F-C61B94E5671C}"/>
               </a:ext>
             </a:extLst>
           </p:cNvPr>
@@ -2507,73 +2525,65 @@
           <a:bodyPr/>
           <a:lstStyle/>
           <a:p>
-            <a:endParaRPr lang="en-GB" dirty="0"/>
+            <a:r>
+              <a:rPr lang="en-GB" dirty="0"/>
+              <a:t>Accessing matrix data</a:t>
+            </a:r>
           </a:p>
         </p:txBody>
       </p:sp>
       <p:sp>
         <p:nvSpPr>
-          <p:cNvPr id="4" name="TextBox 3">
+          <p:cNvPr id="3" name="Content Placeholder 2">
             <a:extLst>
               <a:ext uri="{FF2B5EF4-FFF2-40B4-BE49-F238E27FC236}">
-                <a16:creationId xmlns:a16="http://schemas.microsoft.com/office/drawing/2014/main" id="{31426854-EE0B-4A5A-AC6D-2BF50C4B1D90}"/>
+                <a16:creationId xmlns:a16="http://schemas.microsoft.com/office/drawing/2014/main" id="{B00B5046-B5DF-4F1A-AFA6-4A5FA79CAEFA}"/>
               </a:ext>
             </a:extLst>
           </p:cNvPr>
-          <p:cNvSpPr txBox="1"/>
-          <p:nvPr/>
+          <p:cNvSpPr>
+            <a:spLocks noGrp="1"/>
+          </p:cNvSpPr>
+          <p:nvPr>
+            <p:ph idx="1"/>
+          </p:nvPr>
         </p:nvSpPr>
-        <p:spPr>
-          <a:xfrm>
-            <a:off x="2052408" y="3136612"/>
-            <a:ext cx="8087183" cy="584775"/>
-          </a:xfrm>
-          <a:prstGeom prst="rect">
-            <a:avLst/>
-          </a:prstGeom>
-          <a:noFill/>
-        </p:spPr>
+        <p:spPr/>
         <p:txBody>
-          <a:bodyPr wrap="square" rtlCol="0">
-            <a:spAutoFit/>
-          </a:bodyPr>
+          <a:bodyPr/>
           <a:lstStyle/>
           <a:p>
-            <a:pPr algn="ctr"/>
-            <a:r>
-              <a:rPr lang="en-GB" sz="3200" dirty="0"/>
-              <a:t>Visualising data</a:t>
-            </a:r>
-            <a:endParaRPr lang="en-GB" sz="2800" dirty="0">
-              <a:solidFill>
-                <a:schemeClr val="tx1"/>
-              </a:solidFill>
-            </a:endParaRPr>
+            <a:r>
+              <a:rPr lang="en-GB" sz="2800" dirty="0"/>
+              <a:t>Access values in a matrix using coordinates</a:t>
+            </a:r>
+            <a:endParaRPr lang="en-GB" dirty="0"/>
+          </a:p>
+          <a:p>
+            <a:pPr lvl="1"/>
+            <a:endParaRPr lang="en-GB" dirty="0"/>
+          </a:p>
+          <a:p>
+            <a:pPr marL="0" indent="0">
+              <a:buNone/>
+            </a:pPr>
+            <a:endParaRPr lang="en-GB" dirty="0"/>
+          </a:p>
+          <a:p>
+            <a:endParaRPr lang="en-GB" dirty="0"/>
           </a:p>
         </p:txBody>
       </p:sp>
     </p:spTree>
     <p:extLst>
       <p:ext uri="{BB962C8B-B14F-4D97-AF65-F5344CB8AC3E}">
-        <p14:creationId xmlns:p14="http://schemas.microsoft.com/office/powerpoint/2010/main" val="1305681593"/>
+        <p14:creationId xmlns:p14="http://schemas.microsoft.com/office/powerpoint/2010/main" val="4110354984"/>
       </p:ext>
     </p:extLst>
   </p:cSld>
   <p:clrMapOvr>
     <a:masterClrMapping/>
   </p:clrMapOvr>
-  <mc:AlternateContent xmlns:mc="http://schemas.openxmlformats.org/markup-compatibility/2006" xmlns:p14="http://schemas.microsoft.com/office/powerpoint/2010/main">
-    <mc:Choice Requires="p14">
-      <p:transition p14:dur="300">
-        <p:fade/>
-      </p:transition>
-    </mc:Choice>
-    <mc:Fallback xmlns="">
-      <p:transition>
-        <p:fade/>
-      </p:transition>
-    </mc:Fallback>
-  </mc:AlternateContent>
 </p:sld>
 </file>
 
@@ -2617,7 +2627,7 @@
           <a:p>
             <a:r>
               <a:rPr lang="en-GB" dirty="0"/>
-              <a:t>Image loading</a:t>
+              <a:t>Introduction to matrices</a:t>
             </a:r>
           </a:p>
         </p:txBody>
@@ -2645,46 +2655,47 @@
           <a:p>
             <a:r>
               <a:rPr lang="en-GB" dirty="0"/>
-              <a:t>Figures and plotting</a:t>
+              <a:t>Demo creating a small matrix</a:t>
             </a:r>
           </a:p>
           <a:p>
             <a:r>
               <a:rPr lang="en-GB" dirty="0"/>
-              <a:t>Generate a 1D trace, then plot this</a:t>
+              <a:t>Could use rand(3)</a:t>
             </a:r>
           </a:p>
           <a:p>
             <a:r>
               <a:rPr lang="en-GB" dirty="0"/>
-              <a:t>Functions</a:t>
+              <a:t>Dimension order</a:t>
+            </a:r>
+          </a:p>
+          <a:p>
+            <a:r>
+              <a:rPr lang="en-GB" dirty="0"/>
+              <a:t>Indexing</a:t>
             </a:r>
           </a:p>
           <a:p>
             <a:pPr lvl="1"/>
             <a:r>
               <a:rPr lang="en-GB" dirty="0"/>
-              <a:t>hold</a:t>
+              <a:t>Accessing a single value</a:t>
             </a:r>
           </a:p>
           <a:p>
             <a:pPr lvl="1"/>
             <a:r>
-              <a:rPr lang="en-GB" dirty="0" err="1"/>
-              <a:t>gca</a:t>
-            </a:r>
-            <a:endParaRPr lang="en-GB" dirty="0"/>
-          </a:p>
-          <a:p>
-            <a:pPr lvl="1"/>
-            <a:endParaRPr lang="en-GB" dirty="0"/>
+              <a:rPr lang="en-GB" dirty="0"/>
+              <a:t>Accessing a range of values</a:t>
+            </a:r>
           </a:p>
         </p:txBody>
       </p:sp>
     </p:spTree>
     <p:extLst>
       <p:ext uri="{BB962C8B-B14F-4D97-AF65-F5344CB8AC3E}">
-        <p14:creationId xmlns:p14="http://schemas.microsoft.com/office/powerpoint/2010/main" val="2694363004"/>
+        <p14:creationId xmlns:p14="http://schemas.microsoft.com/office/powerpoint/2010/main" val="2285108047"/>
       </p:ext>
     </p:extLst>
   </p:cSld>
@@ -2716,7 +2727,7 @@
           <p:cNvPr id="2" name="Title 1">
             <a:extLst>
               <a:ext uri="{FF2B5EF4-FFF2-40B4-BE49-F238E27FC236}">
-                <a16:creationId xmlns:a16="http://schemas.microsoft.com/office/drawing/2014/main" id="{8EEF9218-B50A-424A-A99D-57BA08F4A8E3}"/>
+                <a16:creationId xmlns:a16="http://schemas.microsoft.com/office/drawing/2014/main" id="{8B0C5865-E132-43F0-814F-C61B94E5671C}"/>
               </a:ext>
             </a:extLst>
           </p:cNvPr>
@@ -2732,73 +2743,72 @@
           <a:bodyPr/>
           <a:lstStyle/>
           <a:p>
-            <a:endParaRPr lang="en-GB" dirty="0"/>
+            <a:r>
+              <a:rPr lang="en-GB" dirty="0"/>
+              <a:t>Introduction to matrices</a:t>
+            </a:r>
           </a:p>
         </p:txBody>
       </p:sp>
       <p:sp>
         <p:nvSpPr>
-          <p:cNvPr id="4" name="TextBox 3">
+          <p:cNvPr id="3" name="Content Placeholder 2">
             <a:extLst>
               <a:ext uri="{FF2B5EF4-FFF2-40B4-BE49-F238E27FC236}">
-                <a16:creationId xmlns:a16="http://schemas.microsoft.com/office/drawing/2014/main" id="{31426854-EE0B-4A5A-AC6D-2BF50C4B1D90}"/>
+                <a16:creationId xmlns:a16="http://schemas.microsoft.com/office/drawing/2014/main" id="{B00B5046-B5DF-4F1A-AFA6-4A5FA79CAEFA}"/>
               </a:ext>
             </a:extLst>
           </p:cNvPr>
-          <p:cNvSpPr txBox="1"/>
-          <p:nvPr/>
+          <p:cNvSpPr>
+            <a:spLocks noGrp="1"/>
+          </p:cNvSpPr>
+          <p:nvPr>
+            <p:ph idx="1"/>
+          </p:nvPr>
         </p:nvSpPr>
-        <p:spPr>
-          <a:xfrm>
-            <a:off x="2052408" y="3136612"/>
-            <a:ext cx="8087183" cy="584775"/>
-          </a:xfrm>
-          <a:prstGeom prst="rect">
-            <a:avLst/>
-          </a:prstGeom>
-          <a:noFill/>
-        </p:spPr>
+        <p:spPr/>
         <p:txBody>
-          <a:bodyPr wrap="square" rtlCol="0">
-            <a:spAutoFit/>
-          </a:bodyPr>
+          <a:bodyPr/>
           <a:lstStyle/>
           <a:p>
-            <a:pPr algn="ctr"/>
-            <a:r>
-              <a:rPr lang="en-GB" sz="3200" dirty="0"/>
-              <a:t>Image processing</a:t>
-            </a:r>
-            <a:endParaRPr lang="en-GB" sz="2800" dirty="0">
-              <a:solidFill>
-                <a:schemeClr val="tx1"/>
-              </a:solidFill>
-            </a:endParaRPr>
+            <a:r>
+              <a:rPr lang="en-GB" dirty="0"/>
+              <a:t>Matrix operations</a:t>
+            </a:r>
+          </a:p>
+          <a:p>
+            <a:pPr lvl="1"/>
+            <a:r>
+              <a:rPr lang="en-GB" dirty="0"/>
+              <a:t>Start by adding a single value to a matrix</a:t>
+            </a:r>
+          </a:p>
+          <a:p>
+            <a:pPr lvl="1"/>
+            <a:r>
+              <a:rPr lang="en-GB" dirty="0"/>
+              <a:t>Add two matrices together</a:t>
+            </a:r>
+          </a:p>
+          <a:p>
+            <a:pPr lvl="1"/>
+            <a:r>
+              <a:rPr lang="en-GB" dirty="0"/>
+              <a:t>Talk about the element-wise dot (e.g. .*)</a:t>
+            </a:r>
           </a:p>
         </p:txBody>
       </p:sp>
     </p:spTree>
     <p:extLst>
       <p:ext uri="{BB962C8B-B14F-4D97-AF65-F5344CB8AC3E}">
-        <p14:creationId xmlns:p14="http://schemas.microsoft.com/office/powerpoint/2010/main" val="519321222"/>
+        <p14:creationId xmlns:p14="http://schemas.microsoft.com/office/powerpoint/2010/main" val="909048802"/>
       </p:ext>
     </p:extLst>
   </p:cSld>
   <p:clrMapOvr>
     <a:masterClrMapping/>
   </p:clrMapOvr>
-  <mc:AlternateContent xmlns:mc="http://schemas.openxmlformats.org/markup-compatibility/2006" xmlns:p14="http://schemas.microsoft.com/office/powerpoint/2010/main">
-    <mc:Choice Requires="p14">
-      <p:transition p14:dur="300">
-        <p:fade/>
-      </p:transition>
-    </mc:Choice>
-    <mc:Fallback xmlns="">
-      <p:transition>
-        <p:fade/>
-      </p:transition>
-    </mc:Fallback>
-  </mc:AlternateContent>
 </p:sld>
 </file>
 
@@ -2842,7 +2852,7 @@
           <a:p>
             <a:r>
               <a:rPr lang="en-GB" dirty="0"/>
-              <a:t>Image loading</a:t>
+              <a:t>Initialising matrices</a:t>
             </a:r>
           </a:p>
         </p:txBody>
@@ -2870,35 +2880,43 @@
           <a:p>
             <a:r>
               <a:rPr lang="en-GB" dirty="0"/>
-              <a:t>Using standard libraries</a:t>
+              <a:t>Why and how?</a:t>
+            </a:r>
+          </a:p>
+          <a:p>
+            <a:r>
+              <a:rPr lang="en-GB" dirty="0"/>
+              <a:t>Demo of creating a matrix</a:t>
             </a:r>
           </a:p>
           <a:p>
             <a:pPr lvl="1"/>
             <a:r>
-              <a:rPr lang="en-GB" dirty="0" err="1"/>
-              <a:t>imread</a:t>
-            </a:r>
+              <a:rPr lang="en-GB" dirty="0"/>
+              <a:t>Non-initialised</a:t>
+            </a:r>
+          </a:p>
+          <a:p>
+            <a:pPr lvl="1"/>
+            <a:r>
+              <a:rPr lang="en-GB" dirty="0"/>
+              <a:t>Initialised</a:t>
+            </a:r>
+          </a:p>
+          <a:p>
+            <a:pPr lvl="1"/>
             <a:endParaRPr lang="en-GB" dirty="0"/>
           </a:p>
           <a:p>
-            <a:r>
-              <a:rPr lang="en-GB" dirty="0"/>
-              <a:t>Oh look, they’re matrices</a:t>
-            </a:r>
-          </a:p>
-          <a:p>
-            <a:r>
-              <a:rPr lang="en-GB" dirty="0"/>
-              <a:t>Multidimensionality</a:t>
-            </a:r>
+            <a:pPr lvl="1"/>
+            <a:endParaRPr lang="en-GB" dirty="0"/>
           </a:p>
         </p:txBody>
       </p:sp>
     </p:spTree>
     <p:extLst>
       <p:ext uri="{BB962C8B-B14F-4D97-AF65-F5344CB8AC3E}">
-        <p14:creationId xmlns:p14="http://schemas.microsoft.com/office/powerpoint/2010/main" val="2947281789"/>
+        <p14:creationId xmlns:p14="http://schemas.microsoft.com/office/powerpoint/2010/main" val="1466587016"/>
       </p:ext>
     </p:extLst>
   </p:cSld>
@@ -2948,7 +2966,7 @@
           <a:p>
             <a:r>
               <a:rPr lang="en-GB" dirty="0"/>
-              <a:t>Visualising images</a:t>
+              <a:t>Optimising code</a:t>
             </a:r>
           </a:p>
         </p:txBody>
@@ -2976,30 +2994,35 @@
           <a:p>
             <a:r>
               <a:rPr lang="en-GB" dirty="0"/>
-              <a:t>image</a:t>
+              <a:t>Tic toc</a:t>
             </a:r>
           </a:p>
           <a:p>
             <a:pPr lvl="1"/>
             <a:r>
-              <a:rPr lang="en-GB" dirty="0" err="1"/>
-              <a:t>imagesc</a:t>
-            </a:r>
-            <a:endParaRPr lang="en-GB" dirty="0"/>
-          </a:p>
-          <a:p>
-            <a:r>
-              <a:rPr lang="en-GB" dirty="0" err="1"/>
-              <a:t>imshow</a:t>
-            </a:r>
-            <a:endParaRPr lang="en-GB" dirty="0"/>
+              <a:rPr lang="en-GB" dirty="0"/>
+              <a:t>Demo</a:t>
+            </a:r>
+          </a:p>
+          <a:p>
+            <a:r>
+              <a:rPr lang="en-GB" dirty="0"/>
+              <a:t>Profiler</a:t>
+            </a:r>
+          </a:p>
+          <a:p>
+            <a:pPr lvl="1"/>
+            <a:r>
+              <a:rPr lang="en-GB" dirty="0"/>
+              <a:t>Demo</a:t>
+            </a:r>
           </a:p>
         </p:txBody>
       </p:sp>
     </p:spTree>
     <p:extLst>
       <p:ext uri="{BB962C8B-B14F-4D97-AF65-F5344CB8AC3E}">
-        <p14:creationId xmlns:p14="http://schemas.microsoft.com/office/powerpoint/2010/main" val="1668107566"/>
+        <p14:creationId xmlns:p14="http://schemas.microsoft.com/office/powerpoint/2010/main" val="1218872746"/>
       </p:ext>
     </p:extLst>
   </p:cSld>
@@ -3031,7 +3054,7 @@
           <p:cNvPr id="2" name="Title 1">
             <a:extLst>
               <a:ext uri="{FF2B5EF4-FFF2-40B4-BE49-F238E27FC236}">
-                <a16:creationId xmlns:a16="http://schemas.microsoft.com/office/drawing/2014/main" id="{8B0C5865-E132-43F0-814F-C61B94E5671C}"/>
+                <a16:creationId xmlns:a16="http://schemas.microsoft.com/office/drawing/2014/main" id="{8EEF9218-B50A-424A-A99D-57BA08F4A8E3}"/>
               </a:ext>
             </a:extLst>
           </p:cNvPr>
@@ -3047,79 +3070,73 @@
           <a:bodyPr/>
           <a:lstStyle/>
           <a:p>
-            <a:r>
-              <a:rPr lang="en-GB" dirty="0"/>
-              <a:t>Image processing</a:t>
-            </a:r>
+            <a:endParaRPr lang="en-GB" dirty="0"/>
           </a:p>
         </p:txBody>
       </p:sp>
       <p:sp>
         <p:nvSpPr>
-          <p:cNvPr id="3" name="Content Placeholder 2">
+          <p:cNvPr id="4" name="TextBox 3">
             <a:extLst>
               <a:ext uri="{FF2B5EF4-FFF2-40B4-BE49-F238E27FC236}">
-                <a16:creationId xmlns:a16="http://schemas.microsoft.com/office/drawing/2014/main" id="{B00B5046-B5DF-4F1A-AFA6-4A5FA79CAEFA}"/>
+                <a16:creationId xmlns:a16="http://schemas.microsoft.com/office/drawing/2014/main" id="{31426854-EE0B-4A5A-AC6D-2BF50C4B1D90}"/>
               </a:ext>
             </a:extLst>
           </p:cNvPr>
-          <p:cNvSpPr>
-            <a:spLocks noGrp="1"/>
-          </p:cNvSpPr>
-          <p:nvPr>
-            <p:ph idx="1"/>
-          </p:nvPr>
+          <p:cNvSpPr txBox="1"/>
+          <p:nvPr/>
         </p:nvSpPr>
-        <p:spPr/>
+        <p:spPr>
+          <a:xfrm>
+            <a:off x="2052408" y="3136612"/>
+            <a:ext cx="8087183" cy="584775"/>
+          </a:xfrm>
+          <a:prstGeom prst="rect">
+            <a:avLst/>
+          </a:prstGeom>
+          <a:noFill/>
+        </p:spPr>
         <p:txBody>
-          <a:bodyPr/>
+          <a:bodyPr wrap="square" rtlCol="0">
+            <a:spAutoFit/>
+          </a:bodyPr>
           <a:lstStyle/>
           <a:p>
-            <a:r>
-              <a:rPr lang="en-GB" dirty="0"/>
-              <a:t>Filters</a:t>
-            </a:r>
-          </a:p>
-          <a:p>
-            <a:pPr lvl="1"/>
-            <a:r>
-              <a:rPr lang="en-GB" dirty="0"/>
-              <a:t>Median</a:t>
-            </a:r>
-          </a:p>
-          <a:p>
-            <a:pPr lvl="1"/>
-            <a:r>
-              <a:rPr lang="en-GB" dirty="0"/>
-              <a:t>Gaussian</a:t>
-            </a:r>
-            <a:endParaRPr lang="en-GB" b="1" dirty="0"/>
-          </a:p>
-          <a:p>
-            <a:r>
-              <a:rPr lang="en-GB" dirty="0"/>
-              <a:t>Thresholding</a:t>
-            </a:r>
-          </a:p>
-          <a:p>
-            <a:pPr lvl="1"/>
-            <a:r>
-              <a:rPr lang="en-GB" dirty="0"/>
-              <a:t>Otsu method</a:t>
-            </a:r>
+            <a:pPr algn="ctr"/>
+            <a:r>
+              <a:rPr lang="en-GB" sz="3200" dirty="0"/>
+              <a:t>Visualising data</a:t>
+            </a:r>
+            <a:endParaRPr lang="en-GB" sz="2800" dirty="0">
+              <a:solidFill>
+                <a:schemeClr val="tx1"/>
+              </a:solidFill>
+            </a:endParaRPr>
           </a:p>
         </p:txBody>
       </p:sp>
     </p:spTree>
     <p:extLst>
       <p:ext uri="{BB962C8B-B14F-4D97-AF65-F5344CB8AC3E}">
-        <p14:creationId xmlns:p14="http://schemas.microsoft.com/office/powerpoint/2010/main" val="3035785174"/>
+        <p14:creationId xmlns:p14="http://schemas.microsoft.com/office/powerpoint/2010/main" val="1305681593"/>
       </p:ext>
     </p:extLst>
   </p:cSld>
   <p:clrMapOvr>
     <a:masterClrMapping/>
   </p:clrMapOvr>
+  <mc:AlternateContent xmlns:mc="http://schemas.openxmlformats.org/markup-compatibility/2006" xmlns:p14="http://schemas.microsoft.com/office/powerpoint/2010/main">
+    <mc:Choice Requires="p14">
+      <p:transition p14:dur="300">
+        <p:fade/>
+      </p:transition>
+    </mc:Choice>
+    <mc:Fallback xmlns="">
+      <p:transition>
+        <p:fade/>
+      </p:transition>
+    </mc:Fallback>
+  </mc:AlternateContent>
 </p:sld>
 </file>
 
@@ -3163,7 +3180,7 @@
           <a:p>
             <a:r>
               <a:rPr lang="en-GB" dirty="0"/>
-              <a:t>Saving images</a:t>
+              <a:t>Image loading</a:t>
             </a:r>
           </a:p>
         </p:txBody>
@@ -3190,9 +3207,39 @@
           <a:lstStyle/>
           <a:p>
             <a:r>
+              <a:rPr lang="en-GB" dirty="0"/>
+              <a:t>Figures and plotting</a:t>
+            </a:r>
+          </a:p>
+          <a:p>
+            <a:r>
+              <a:rPr lang="en-GB" dirty="0"/>
+              <a:t>Generate a 1D trace, then plot this</a:t>
+            </a:r>
+          </a:p>
+          <a:p>
+            <a:r>
+              <a:rPr lang="en-GB" dirty="0"/>
+              <a:t>Functions</a:t>
+            </a:r>
+          </a:p>
+          <a:p>
+            <a:pPr lvl="1"/>
+            <a:r>
+              <a:rPr lang="en-GB" dirty="0"/>
+              <a:t>hold</a:t>
+            </a:r>
+          </a:p>
+          <a:p>
+            <a:pPr lvl="1"/>
+            <a:r>
               <a:rPr lang="en-GB" dirty="0" err="1"/>
-              <a:t>imwrite</a:t>
-            </a:r>
+              <a:t>gca</a:t>
+            </a:r>
+            <a:endParaRPr lang="en-GB" dirty="0"/>
+          </a:p>
+          <a:p>
+            <a:pPr lvl="1"/>
             <a:endParaRPr lang="en-GB" dirty="0"/>
           </a:p>
         </p:txBody>
@@ -3200,7 +3247,221 @@
     </p:spTree>
     <p:extLst>
       <p:ext uri="{BB962C8B-B14F-4D97-AF65-F5344CB8AC3E}">
-        <p14:creationId xmlns:p14="http://schemas.microsoft.com/office/powerpoint/2010/main" val="4047485129"/>
+        <p14:creationId xmlns:p14="http://schemas.microsoft.com/office/powerpoint/2010/main" val="2694363004"/>
+      </p:ext>
+    </p:extLst>
+  </p:cSld>
+  <p:clrMapOvr>
+    <a:masterClrMapping/>
+  </p:clrMapOvr>
+</p:sld>
+</file>
+
+<file path=ppt/slides/slide18.xml><?xml version="1.0" encoding="utf-8"?>
+<p:sld xmlns:a="http://schemas.openxmlformats.org/drawingml/2006/main" xmlns:r="http://schemas.openxmlformats.org/officeDocument/2006/relationships" xmlns:p="http://schemas.openxmlformats.org/presentationml/2006/main">
+  <p:cSld>
+    <p:spTree>
+      <p:nvGrpSpPr>
+        <p:cNvPr id="1" name=""/>
+        <p:cNvGrpSpPr/>
+        <p:nvPr/>
+      </p:nvGrpSpPr>
+      <p:grpSpPr>
+        <a:xfrm>
+          <a:off x="0" y="0"/>
+          <a:ext cx="0" cy="0"/>
+          <a:chOff x="0" y="0"/>
+          <a:chExt cx="0" cy="0"/>
+        </a:xfrm>
+      </p:grpSpPr>
+      <p:sp>
+        <p:nvSpPr>
+          <p:cNvPr id="2" name="Title 1">
+            <a:extLst>
+              <a:ext uri="{FF2B5EF4-FFF2-40B4-BE49-F238E27FC236}">
+                <a16:creationId xmlns:a16="http://schemas.microsoft.com/office/drawing/2014/main" id="{8EEF9218-B50A-424A-A99D-57BA08F4A8E3}"/>
+              </a:ext>
+            </a:extLst>
+          </p:cNvPr>
+          <p:cNvSpPr>
+            <a:spLocks noGrp="1"/>
+          </p:cNvSpPr>
+          <p:nvPr>
+            <p:ph type="title"/>
+          </p:nvPr>
+        </p:nvSpPr>
+        <p:spPr/>
+        <p:txBody>
+          <a:bodyPr/>
+          <a:lstStyle/>
+          <a:p>
+            <a:endParaRPr lang="en-GB" dirty="0"/>
+          </a:p>
+        </p:txBody>
+      </p:sp>
+      <p:sp>
+        <p:nvSpPr>
+          <p:cNvPr id="4" name="TextBox 3">
+            <a:extLst>
+              <a:ext uri="{FF2B5EF4-FFF2-40B4-BE49-F238E27FC236}">
+                <a16:creationId xmlns:a16="http://schemas.microsoft.com/office/drawing/2014/main" id="{31426854-EE0B-4A5A-AC6D-2BF50C4B1D90}"/>
+              </a:ext>
+            </a:extLst>
+          </p:cNvPr>
+          <p:cNvSpPr txBox="1"/>
+          <p:nvPr/>
+        </p:nvSpPr>
+        <p:spPr>
+          <a:xfrm>
+            <a:off x="2052408" y="3136612"/>
+            <a:ext cx="8087183" cy="584775"/>
+          </a:xfrm>
+          <a:prstGeom prst="rect">
+            <a:avLst/>
+          </a:prstGeom>
+          <a:noFill/>
+        </p:spPr>
+        <p:txBody>
+          <a:bodyPr wrap="square" rtlCol="0">
+            <a:spAutoFit/>
+          </a:bodyPr>
+          <a:lstStyle/>
+          <a:p>
+            <a:pPr algn="ctr"/>
+            <a:r>
+              <a:rPr lang="en-GB" sz="3200" dirty="0"/>
+              <a:t>Image processing</a:t>
+            </a:r>
+            <a:endParaRPr lang="en-GB" sz="2800" dirty="0">
+              <a:solidFill>
+                <a:schemeClr val="tx1"/>
+              </a:solidFill>
+            </a:endParaRPr>
+          </a:p>
+        </p:txBody>
+      </p:sp>
+    </p:spTree>
+    <p:extLst>
+      <p:ext uri="{BB962C8B-B14F-4D97-AF65-F5344CB8AC3E}">
+        <p14:creationId xmlns:p14="http://schemas.microsoft.com/office/powerpoint/2010/main" val="519321222"/>
+      </p:ext>
+    </p:extLst>
+  </p:cSld>
+  <p:clrMapOvr>
+    <a:masterClrMapping/>
+  </p:clrMapOvr>
+  <mc:AlternateContent xmlns:mc="http://schemas.openxmlformats.org/markup-compatibility/2006" xmlns:p14="http://schemas.microsoft.com/office/powerpoint/2010/main">
+    <mc:Choice Requires="p14">
+      <p:transition p14:dur="300">
+        <p:fade/>
+      </p:transition>
+    </mc:Choice>
+    <mc:Fallback xmlns="">
+      <p:transition>
+        <p:fade/>
+      </p:transition>
+    </mc:Fallback>
+  </mc:AlternateContent>
+</p:sld>
+</file>
+
+<file path=ppt/slides/slide19.xml><?xml version="1.0" encoding="utf-8"?>
+<p:sld xmlns:a="http://schemas.openxmlformats.org/drawingml/2006/main" xmlns:r="http://schemas.openxmlformats.org/officeDocument/2006/relationships" xmlns:p="http://schemas.openxmlformats.org/presentationml/2006/main">
+  <p:cSld>
+    <p:spTree>
+      <p:nvGrpSpPr>
+        <p:cNvPr id="1" name=""/>
+        <p:cNvGrpSpPr/>
+        <p:nvPr/>
+      </p:nvGrpSpPr>
+      <p:grpSpPr>
+        <a:xfrm>
+          <a:off x="0" y="0"/>
+          <a:ext cx="0" cy="0"/>
+          <a:chOff x="0" y="0"/>
+          <a:chExt cx="0" cy="0"/>
+        </a:xfrm>
+      </p:grpSpPr>
+      <p:sp>
+        <p:nvSpPr>
+          <p:cNvPr id="2" name="Title 1">
+            <a:extLst>
+              <a:ext uri="{FF2B5EF4-FFF2-40B4-BE49-F238E27FC236}">
+                <a16:creationId xmlns:a16="http://schemas.microsoft.com/office/drawing/2014/main" id="{8B0C5865-E132-43F0-814F-C61B94E5671C}"/>
+              </a:ext>
+            </a:extLst>
+          </p:cNvPr>
+          <p:cNvSpPr>
+            <a:spLocks noGrp="1"/>
+          </p:cNvSpPr>
+          <p:nvPr>
+            <p:ph type="title"/>
+          </p:nvPr>
+        </p:nvSpPr>
+        <p:spPr/>
+        <p:txBody>
+          <a:bodyPr/>
+          <a:lstStyle/>
+          <a:p>
+            <a:r>
+              <a:rPr lang="en-GB" dirty="0"/>
+              <a:t>Image loading</a:t>
+            </a:r>
+          </a:p>
+        </p:txBody>
+      </p:sp>
+      <p:sp>
+        <p:nvSpPr>
+          <p:cNvPr id="3" name="Content Placeholder 2">
+            <a:extLst>
+              <a:ext uri="{FF2B5EF4-FFF2-40B4-BE49-F238E27FC236}">
+                <a16:creationId xmlns:a16="http://schemas.microsoft.com/office/drawing/2014/main" id="{B00B5046-B5DF-4F1A-AFA6-4A5FA79CAEFA}"/>
+              </a:ext>
+            </a:extLst>
+          </p:cNvPr>
+          <p:cNvSpPr>
+            <a:spLocks noGrp="1"/>
+          </p:cNvSpPr>
+          <p:nvPr>
+            <p:ph idx="1"/>
+          </p:nvPr>
+        </p:nvSpPr>
+        <p:spPr/>
+        <p:txBody>
+          <a:bodyPr/>
+          <a:lstStyle/>
+          <a:p>
+            <a:r>
+              <a:rPr lang="en-GB" dirty="0"/>
+              <a:t>Using standard libraries</a:t>
+            </a:r>
+          </a:p>
+          <a:p>
+            <a:pPr lvl="1"/>
+            <a:r>
+              <a:rPr lang="en-GB" dirty="0" err="1"/>
+              <a:t>imread</a:t>
+            </a:r>
+            <a:endParaRPr lang="en-GB" dirty="0"/>
+          </a:p>
+          <a:p>
+            <a:r>
+              <a:rPr lang="en-GB" dirty="0"/>
+              <a:t>Oh look, they’re matrices</a:t>
+            </a:r>
+          </a:p>
+          <a:p>
+            <a:r>
+              <a:rPr lang="en-GB" dirty="0"/>
+              <a:t>Multidimensionality</a:t>
+            </a:r>
+          </a:p>
+        </p:txBody>
+      </p:sp>
+    </p:spTree>
+    <p:extLst>
+      <p:ext uri="{BB962C8B-B14F-4D97-AF65-F5344CB8AC3E}">
+        <p14:creationId xmlns:p14="http://schemas.microsoft.com/office/powerpoint/2010/main" val="2947281789"/>
       </p:ext>
     </p:extLst>
   </p:cSld>
@@ -3899,6 +4160,47 @@
           </p:txBody>
         </p:sp>
       </p:grpSp>
+      <p:cxnSp>
+        <p:nvCxnSpPr>
+          <p:cNvPr id="9" name="Straight Connector 8">
+            <a:extLst>
+              <a:ext uri="{FF2B5EF4-FFF2-40B4-BE49-F238E27FC236}">
+                <a16:creationId xmlns:a16="http://schemas.microsoft.com/office/drawing/2014/main" id="{80BBB059-26DA-449D-AAC9-D94184DEC30C}"/>
+              </a:ext>
+            </a:extLst>
+          </p:cNvPr>
+          <p:cNvCxnSpPr/>
+          <p:nvPr/>
+        </p:nvCxnSpPr>
+        <p:spPr>
+          <a:xfrm>
+            <a:off x="6862194" y="1946246"/>
+            <a:ext cx="2457975" cy="0"/>
+          </a:xfrm>
+          <a:prstGeom prst="line">
+            <a:avLst/>
+          </a:prstGeom>
+          <a:ln w="57150">
+            <a:solidFill>
+              <a:srgbClr val="FF0000"/>
+            </a:solidFill>
+          </a:ln>
+        </p:spPr>
+        <p:style>
+          <a:lnRef idx="1">
+            <a:schemeClr val="accent1"/>
+          </a:lnRef>
+          <a:fillRef idx="0">
+            <a:schemeClr val="accent1"/>
+          </a:fillRef>
+          <a:effectRef idx="0">
+            <a:schemeClr val="accent1"/>
+          </a:effectRef>
+          <a:fontRef idx="minor">
+            <a:schemeClr val="tx1"/>
+          </a:fontRef>
+        </p:style>
+      </p:cxnSp>
     </p:spTree>
     <p:extLst>
       <p:ext uri="{BB962C8B-B14F-4D97-AF65-F5344CB8AC3E}">
@@ -4007,6 +4309,308 @@
 </p:sld>
 </file>
 
+<file path=ppt/slides/slide20.xml><?xml version="1.0" encoding="utf-8"?>
+<p:sld xmlns:a="http://schemas.openxmlformats.org/drawingml/2006/main" xmlns:r="http://schemas.openxmlformats.org/officeDocument/2006/relationships" xmlns:p="http://schemas.openxmlformats.org/presentationml/2006/main">
+  <p:cSld>
+    <p:spTree>
+      <p:nvGrpSpPr>
+        <p:cNvPr id="1" name=""/>
+        <p:cNvGrpSpPr/>
+        <p:nvPr/>
+      </p:nvGrpSpPr>
+      <p:grpSpPr>
+        <a:xfrm>
+          <a:off x="0" y="0"/>
+          <a:ext cx="0" cy="0"/>
+          <a:chOff x="0" y="0"/>
+          <a:chExt cx="0" cy="0"/>
+        </a:xfrm>
+      </p:grpSpPr>
+      <p:sp>
+        <p:nvSpPr>
+          <p:cNvPr id="2" name="Title 1">
+            <a:extLst>
+              <a:ext uri="{FF2B5EF4-FFF2-40B4-BE49-F238E27FC236}">
+                <a16:creationId xmlns:a16="http://schemas.microsoft.com/office/drawing/2014/main" id="{8B0C5865-E132-43F0-814F-C61B94E5671C}"/>
+              </a:ext>
+            </a:extLst>
+          </p:cNvPr>
+          <p:cNvSpPr>
+            <a:spLocks noGrp="1"/>
+          </p:cNvSpPr>
+          <p:nvPr>
+            <p:ph type="title"/>
+          </p:nvPr>
+        </p:nvSpPr>
+        <p:spPr/>
+        <p:txBody>
+          <a:bodyPr/>
+          <a:lstStyle/>
+          <a:p>
+            <a:r>
+              <a:rPr lang="en-GB" dirty="0"/>
+              <a:t>Visualising images</a:t>
+            </a:r>
+          </a:p>
+        </p:txBody>
+      </p:sp>
+      <p:sp>
+        <p:nvSpPr>
+          <p:cNvPr id="3" name="Content Placeholder 2">
+            <a:extLst>
+              <a:ext uri="{FF2B5EF4-FFF2-40B4-BE49-F238E27FC236}">
+                <a16:creationId xmlns:a16="http://schemas.microsoft.com/office/drawing/2014/main" id="{B00B5046-B5DF-4F1A-AFA6-4A5FA79CAEFA}"/>
+              </a:ext>
+            </a:extLst>
+          </p:cNvPr>
+          <p:cNvSpPr>
+            <a:spLocks noGrp="1"/>
+          </p:cNvSpPr>
+          <p:nvPr>
+            <p:ph idx="1"/>
+          </p:nvPr>
+        </p:nvSpPr>
+        <p:spPr/>
+        <p:txBody>
+          <a:bodyPr/>
+          <a:lstStyle/>
+          <a:p>
+            <a:r>
+              <a:rPr lang="en-GB" dirty="0"/>
+              <a:t>image</a:t>
+            </a:r>
+          </a:p>
+          <a:p>
+            <a:pPr lvl="1"/>
+            <a:r>
+              <a:rPr lang="en-GB" dirty="0" err="1"/>
+              <a:t>imagesc</a:t>
+            </a:r>
+            <a:endParaRPr lang="en-GB" dirty="0"/>
+          </a:p>
+          <a:p>
+            <a:r>
+              <a:rPr lang="en-GB" dirty="0" err="1"/>
+              <a:t>imshow</a:t>
+            </a:r>
+            <a:endParaRPr lang="en-GB" dirty="0"/>
+          </a:p>
+        </p:txBody>
+      </p:sp>
+    </p:spTree>
+    <p:extLst>
+      <p:ext uri="{BB962C8B-B14F-4D97-AF65-F5344CB8AC3E}">
+        <p14:creationId xmlns:p14="http://schemas.microsoft.com/office/powerpoint/2010/main" val="1668107566"/>
+      </p:ext>
+    </p:extLst>
+  </p:cSld>
+  <p:clrMapOvr>
+    <a:masterClrMapping/>
+  </p:clrMapOvr>
+</p:sld>
+</file>
+
+<file path=ppt/slides/slide21.xml><?xml version="1.0" encoding="utf-8"?>
+<p:sld xmlns:a="http://schemas.openxmlformats.org/drawingml/2006/main" xmlns:r="http://schemas.openxmlformats.org/officeDocument/2006/relationships" xmlns:p="http://schemas.openxmlformats.org/presentationml/2006/main">
+  <p:cSld>
+    <p:spTree>
+      <p:nvGrpSpPr>
+        <p:cNvPr id="1" name=""/>
+        <p:cNvGrpSpPr/>
+        <p:nvPr/>
+      </p:nvGrpSpPr>
+      <p:grpSpPr>
+        <a:xfrm>
+          <a:off x="0" y="0"/>
+          <a:ext cx="0" cy="0"/>
+          <a:chOff x="0" y="0"/>
+          <a:chExt cx="0" cy="0"/>
+        </a:xfrm>
+      </p:grpSpPr>
+      <p:sp>
+        <p:nvSpPr>
+          <p:cNvPr id="2" name="Title 1">
+            <a:extLst>
+              <a:ext uri="{FF2B5EF4-FFF2-40B4-BE49-F238E27FC236}">
+                <a16:creationId xmlns:a16="http://schemas.microsoft.com/office/drawing/2014/main" id="{8B0C5865-E132-43F0-814F-C61B94E5671C}"/>
+              </a:ext>
+            </a:extLst>
+          </p:cNvPr>
+          <p:cNvSpPr>
+            <a:spLocks noGrp="1"/>
+          </p:cNvSpPr>
+          <p:nvPr>
+            <p:ph type="title"/>
+          </p:nvPr>
+        </p:nvSpPr>
+        <p:spPr/>
+        <p:txBody>
+          <a:bodyPr/>
+          <a:lstStyle/>
+          <a:p>
+            <a:r>
+              <a:rPr lang="en-GB" dirty="0"/>
+              <a:t>Image processing</a:t>
+            </a:r>
+          </a:p>
+        </p:txBody>
+      </p:sp>
+      <p:sp>
+        <p:nvSpPr>
+          <p:cNvPr id="3" name="Content Placeholder 2">
+            <a:extLst>
+              <a:ext uri="{FF2B5EF4-FFF2-40B4-BE49-F238E27FC236}">
+                <a16:creationId xmlns:a16="http://schemas.microsoft.com/office/drawing/2014/main" id="{B00B5046-B5DF-4F1A-AFA6-4A5FA79CAEFA}"/>
+              </a:ext>
+            </a:extLst>
+          </p:cNvPr>
+          <p:cNvSpPr>
+            <a:spLocks noGrp="1"/>
+          </p:cNvSpPr>
+          <p:nvPr>
+            <p:ph idx="1"/>
+          </p:nvPr>
+        </p:nvSpPr>
+        <p:spPr/>
+        <p:txBody>
+          <a:bodyPr/>
+          <a:lstStyle/>
+          <a:p>
+            <a:r>
+              <a:rPr lang="en-GB" dirty="0"/>
+              <a:t>Filters</a:t>
+            </a:r>
+          </a:p>
+          <a:p>
+            <a:pPr lvl="1"/>
+            <a:r>
+              <a:rPr lang="en-GB" dirty="0"/>
+              <a:t>Median</a:t>
+            </a:r>
+          </a:p>
+          <a:p>
+            <a:pPr lvl="1"/>
+            <a:r>
+              <a:rPr lang="en-GB" dirty="0"/>
+              <a:t>Gaussian</a:t>
+            </a:r>
+            <a:endParaRPr lang="en-GB" b="1" dirty="0"/>
+          </a:p>
+          <a:p>
+            <a:r>
+              <a:rPr lang="en-GB" dirty="0"/>
+              <a:t>Thresholding</a:t>
+            </a:r>
+          </a:p>
+          <a:p>
+            <a:pPr lvl="1"/>
+            <a:r>
+              <a:rPr lang="en-GB" dirty="0"/>
+              <a:t>Otsu method</a:t>
+            </a:r>
+          </a:p>
+        </p:txBody>
+      </p:sp>
+    </p:spTree>
+    <p:extLst>
+      <p:ext uri="{BB962C8B-B14F-4D97-AF65-F5344CB8AC3E}">
+        <p14:creationId xmlns:p14="http://schemas.microsoft.com/office/powerpoint/2010/main" val="3035785174"/>
+      </p:ext>
+    </p:extLst>
+  </p:cSld>
+  <p:clrMapOvr>
+    <a:masterClrMapping/>
+  </p:clrMapOvr>
+</p:sld>
+</file>
+
+<file path=ppt/slides/slide22.xml><?xml version="1.0" encoding="utf-8"?>
+<p:sld xmlns:a="http://schemas.openxmlformats.org/drawingml/2006/main" xmlns:r="http://schemas.openxmlformats.org/officeDocument/2006/relationships" xmlns:p="http://schemas.openxmlformats.org/presentationml/2006/main">
+  <p:cSld>
+    <p:spTree>
+      <p:nvGrpSpPr>
+        <p:cNvPr id="1" name=""/>
+        <p:cNvGrpSpPr/>
+        <p:nvPr/>
+      </p:nvGrpSpPr>
+      <p:grpSpPr>
+        <a:xfrm>
+          <a:off x="0" y="0"/>
+          <a:ext cx="0" cy="0"/>
+          <a:chOff x="0" y="0"/>
+          <a:chExt cx="0" cy="0"/>
+        </a:xfrm>
+      </p:grpSpPr>
+      <p:sp>
+        <p:nvSpPr>
+          <p:cNvPr id="2" name="Title 1">
+            <a:extLst>
+              <a:ext uri="{FF2B5EF4-FFF2-40B4-BE49-F238E27FC236}">
+                <a16:creationId xmlns:a16="http://schemas.microsoft.com/office/drawing/2014/main" id="{8B0C5865-E132-43F0-814F-C61B94E5671C}"/>
+              </a:ext>
+            </a:extLst>
+          </p:cNvPr>
+          <p:cNvSpPr>
+            <a:spLocks noGrp="1"/>
+          </p:cNvSpPr>
+          <p:nvPr>
+            <p:ph type="title"/>
+          </p:nvPr>
+        </p:nvSpPr>
+        <p:spPr/>
+        <p:txBody>
+          <a:bodyPr/>
+          <a:lstStyle/>
+          <a:p>
+            <a:r>
+              <a:rPr lang="en-GB" dirty="0"/>
+              <a:t>Saving images</a:t>
+            </a:r>
+          </a:p>
+        </p:txBody>
+      </p:sp>
+      <p:sp>
+        <p:nvSpPr>
+          <p:cNvPr id="3" name="Content Placeholder 2">
+            <a:extLst>
+              <a:ext uri="{FF2B5EF4-FFF2-40B4-BE49-F238E27FC236}">
+                <a16:creationId xmlns:a16="http://schemas.microsoft.com/office/drawing/2014/main" id="{B00B5046-B5DF-4F1A-AFA6-4A5FA79CAEFA}"/>
+              </a:ext>
+            </a:extLst>
+          </p:cNvPr>
+          <p:cNvSpPr>
+            <a:spLocks noGrp="1"/>
+          </p:cNvSpPr>
+          <p:nvPr>
+            <p:ph idx="1"/>
+          </p:nvPr>
+        </p:nvSpPr>
+        <p:spPr/>
+        <p:txBody>
+          <a:bodyPr/>
+          <a:lstStyle/>
+          <a:p>
+            <a:r>
+              <a:rPr lang="en-GB" dirty="0" err="1"/>
+              <a:t>imwrite</a:t>
+            </a:r>
+            <a:endParaRPr lang="en-GB" dirty="0"/>
+          </a:p>
+        </p:txBody>
+      </p:sp>
+    </p:spTree>
+    <p:extLst>
+      <p:ext uri="{BB962C8B-B14F-4D97-AF65-F5344CB8AC3E}">
+        <p14:creationId xmlns:p14="http://schemas.microsoft.com/office/powerpoint/2010/main" val="4047485129"/>
+      </p:ext>
+    </p:extLst>
+  </p:cSld>
+  <p:clrMapOvr>
+    <a:masterClrMapping/>
+  </p:clrMapOvr>
+</p:sld>
+</file>
+
 <file path=ppt/slides/slide3.xml><?xml version="1.0" encoding="utf-8"?>
 <p:sld xmlns:a="http://schemas.openxmlformats.org/drawingml/2006/main" xmlns:r="http://schemas.openxmlformats.org/officeDocument/2006/relationships" xmlns:p="http://schemas.openxmlformats.org/presentationml/2006/main">
   <p:cSld>
@@ -4087,6 +4691,57 @@
                 <a:schemeClr val="tx1"/>
               </a:solidFill>
             </a:endParaRPr>
+          </a:p>
+        </p:txBody>
+      </p:sp>
+      <p:sp>
+        <p:nvSpPr>
+          <p:cNvPr id="5" name="TextBox 4">
+            <a:extLst>
+              <a:ext uri="{FF2B5EF4-FFF2-40B4-BE49-F238E27FC236}">
+                <a16:creationId xmlns:a16="http://schemas.microsoft.com/office/drawing/2014/main" id="{88A0D0CE-853E-4791-888E-234DF0D515B0}"/>
+              </a:ext>
+            </a:extLst>
+          </p:cNvPr>
+          <p:cNvSpPr txBox="1"/>
+          <p:nvPr/>
+        </p:nvSpPr>
+        <p:spPr>
+          <a:xfrm>
+            <a:off x="2417266" y="3661459"/>
+            <a:ext cx="7482980" cy="1569660"/>
+          </a:xfrm>
+          <a:prstGeom prst="rect">
+            <a:avLst/>
+          </a:prstGeom>
+          <a:noFill/>
+        </p:spPr>
+        <p:txBody>
+          <a:bodyPr wrap="square" rtlCol="0">
+            <a:spAutoFit/>
+          </a:bodyPr>
+          <a:lstStyle/>
+          <a:p>
+            <a:pPr algn="ctr"/>
+            <a:r>
+              <a:rPr lang="en-GB" sz="4800" dirty="0">
+                <a:solidFill>
+                  <a:srgbClr val="FF0000"/>
+                </a:solidFill>
+              </a:rPr>
+              <a:t>Is this necessary?  </a:t>
+            </a:r>
+          </a:p>
+          <a:p>
+            <a:pPr algn="ctr"/>
+            <a:r>
+              <a:rPr lang="en-GB" sz="4800" dirty="0">
+                <a:solidFill>
+                  <a:srgbClr val="FF0000"/>
+                </a:solidFill>
+              </a:rPr>
+              <a:t>It’s just another function…</a:t>
+            </a:r>
           </a:p>
         </p:txBody>
       </p:sp>
@@ -4219,6 +4874,57 @@
           </a:p>
         </p:txBody>
       </p:sp>
+      <p:sp>
+        <p:nvSpPr>
+          <p:cNvPr id="4" name="TextBox 3">
+            <a:extLst>
+              <a:ext uri="{FF2B5EF4-FFF2-40B4-BE49-F238E27FC236}">
+                <a16:creationId xmlns:a16="http://schemas.microsoft.com/office/drawing/2014/main" id="{AFE64C81-16B2-435A-9A2D-48939DC62FC4}"/>
+              </a:ext>
+            </a:extLst>
+          </p:cNvPr>
+          <p:cNvSpPr txBox="1"/>
+          <p:nvPr/>
+        </p:nvSpPr>
+        <p:spPr>
+          <a:xfrm>
+            <a:off x="2417266" y="3661459"/>
+            <a:ext cx="7482980" cy="1569660"/>
+          </a:xfrm>
+          <a:prstGeom prst="rect">
+            <a:avLst/>
+          </a:prstGeom>
+          <a:noFill/>
+        </p:spPr>
+        <p:txBody>
+          <a:bodyPr wrap="square" rtlCol="0">
+            <a:spAutoFit/>
+          </a:bodyPr>
+          <a:lstStyle/>
+          <a:p>
+            <a:pPr algn="ctr"/>
+            <a:r>
+              <a:rPr lang="en-GB" sz="4800" dirty="0">
+                <a:solidFill>
+                  <a:srgbClr val="FF0000"/>
+                </a:solidFill>
+              </a:rPr>
+              <a:t>Is this necessary?  </a:t>
+            </a:r>
+          </a:p>
+          <a:p>
+            <a:pPr algn="ctr"/>
+            <a:r>
+              <a:rPr lang="en-GB" sz="4800" dirty="0">
+                <a:solidFill>
+                  <a:srgbClr val="FF0000"/>
+                </a:solidFill>
+              </a:rPr>
+              <a:t>It’s just another function…</a:t>
+            </a:r>
+          </a:p>
+        </p:txBody>
+      </p:sp>
     </p:spTree>
     <p:extLst>
       <p:ext uri="{BB962C8B-B14F-4D97-AF65-F5344CB8AC3E}">
@@ -4320,6 +5026,61 @@
             <a:r>
               <a:rPr lang="en-GB" dirty="0"/>
               <a:t> (say we will cover this in more detail later)</a:t>
+            </a:r>
+          </a:p>
+          <a:p>
+            <a:pPr lvl="1"/>
+            <a:endParaRPr lang="en-GB" dirty="0"/>
+          </a:p>
+        </p:txBody>
+      </p:sp>
+      <p:sp>
+        <p:nvSpPr>
+          <p:cNvPr id="4" name="TextBox 3">
+            <a:extLst>
+              <a:ext uri="{FF2B5EF4-FFF2-40B4-BE49-F238E27FC236}">
+                <a16:creationId xmlns:a16="http://schemas.microsoft.com/office/drawing/2014/main" id="{8698B1F1-5740-427E-879D-71EAD4CF19C1}"/>
+              </a:ext>
+            </a:extLst>
+          </p:cNvPr>
+          <p:cNvSpPr txBox="1"/>
+          <p:nvPr/>
+        </p:nvSpPr>
+        <p:spPr>
+          <a:xfrm>
+            <a:off x="2417266" y="3661459"/>
+            <a:ext cx="7482980" cy="1569660"/>
+          </a:xfrm>
+          <a:prstGeom prst="rect">
+            <a:avLst/>
+          </a:prstGeom>
+          <a:noFill/>
+        </p:spPr>
+        <p:txBody>
+          <a:bodyPr wrap="square" rtlCol="0">
+            <a:spAutoFit/>
+          </a:bodyPr>
+          <a:lstStyle/>
+          <a:p>
+            <a:pPr algn="ctr"/>
+            <a:r>
+              <a:rPr lang="en-GB" sz="4800" dirty="0">
+                <a:solidFill>
+                  <a:srgbClr val="FF0000"/>
+                </a:solidFill>
+              </a:rPr>
+              <a:t>Is this necessary?  </a:t>
+            </a:r>
+          </a:p>
+          <a:p>
+            <a:pPr algn="ctr"/>
+            <a:r>
+              <a:rPr lang="en-GB" sz="4800" dirty="0">
+                <a:solidFill>
+                  <a:srgbClr val="FF0000"/>
+                </a:solidFill>
+              </a:rPr>
+              <a:t>It’s just another function…</a:t>
             </a:r>
           </a:p>
         </p:txBody>
@@ -4512,38 +5273,91 @@
           <a:lstStyle/>
           <a:p>
             <a:r>
+              <a:rPr lang="en-GB" sz="2800" dirty="0"/>
+              <a:t>So far we’ve only looked at variables holding a single value</a:t>
+            </a:r>
+          </a:p>
+          <a:p>
+            <a:endParaRPr lang="en-GB" sz="1200" dirty="0"/>
+          </a:p>
+          <a:p>
+            <a:r>
               <a:rPr lang="en-GB" dirty="0"/>
-              <a:t>Demo creating a small matrix</a:t>
-            </a:r>
-          </a:p>
-          <a:p>
+              <a:t>Matrices hold multiple numeric values in an n-dimensional grid</a:t>
+            </a:r>
+          </a:p>
+          <a:p>
+            <a:pPr lvl="1"/>
             <a:r>
               <a:rPr lang="en-GB" dirty="0"/>
-              <a:t>Could use rand(3)</a:t>
-            </a:r>
-          </a:p>
-          <a:p>
+              <a:t>MATLAB is specifically optimised for calculations on these</a:t>
+            </a:r>
+          </a:p>
+          <a:p>
+            <a:pPr lvl="1"/>
             <a:r>
               <a:rPr lang="en-GB" dirty="0"/>
-              <a:t>Indexing</a:t>
+              <a:t>Have a minimum of 2 dimensions (XY)</a:t>
             </a:r>
           </a:p>
           <a:p>
             <a:pPr lvl="1"/>
             <a:r>
               <a:rPr lang="en-GB" dirty="0"/>
-              <a:t>Accessing a single value</a:t>
+              <a:t>XY dimensions always specified first in the order (row, column)</a:t>
             </a:r>
           </a:p>
           <a:p>
             <a:pPr lvl="1"/>
-            <a:r>
-              <a:rPr lang="en-GB" dirty="0"/>
-              <a:t>Accessing a range of values</a:t>
-            </a:r>
+            <a:endParaRPr lang="en-GB" dirty="0"/>
+          </a:p>
+          <a:p>
+            <a:pPr marL="0" indent="0">
+              <a:buNone/>
+            </a:pPr>
+            <a:endParaRPr lang="en-GB" dirty="0"/>
+          </a:p>
+          <a:p>
+            <a:endParaRPr lang="en-GB" dirty="0"/>
           </a:p>
         </p:txBody>
       </p:sp>
+      <p:pic>
+        <p:nvPicPr>
+          <p:cNvPr id="5" name="Picture 4">
+            <a:extLst>
+              <a:ext uri="{FF2B5EF4-FFF2-40B4-BE49-F238E27FC236}">
+                <a16:creationId xmlns:a16="http://schemas.microsoft.com/office/drawing/2014/main" id="{B1FEA4F3-C917-4C3E-BA69-FAE55AB9EAB2}"/>
+              </a:ext>
+            </a:extLst>
+          </p:cNvPr>
+          <p:cNvPicPr>
+            <a:picLocks noChangeAspect="1"/>
+          </p:cNvPicPr>
+          <p:nvPr/>
+        </p:nvPicPr>
+        <p:blipFill>
+          <a:blip r:embed="rId2">
+            <a:extLst>
+              <a:ext uri="{28A0092B-C50C-407E-A947-70E740481C1C}">
+                <a14:useLocalDpi xmlns:a14="http://schemas.microsoft.com/office/drawing/2010/main" val="0"/>
+              </a:ext>
+            </a:extLst>
+          </a:blip>
+          <a:stretch>
+            <a:fillRect/>
+          </a:stretch>
+        </p:blipFill>
+        <p:spPr>
+          <a:xfrm>
+            <a:off x="3186604" y="3880684"/>
+            <a:ext cx="5818792" cy="2160442"/>
+          </a:xfrm>
+          <a:prstGeom prst="rect">
+            <a:avLst/>
+          </a:prstGeom>
+        </p:spPr>
+      </p:pic>
     </p:spTree>
     <p:extLst>
       <p:ext uri="{BB962C8B-B14F-4D97-AF65-F5344CB8AC3E}">
@@ -4597,7 +5411,7 @@
           <a:p>
             <a:r>
               <a:rPr lang="en-GB" dirty="0"/>
-              <a:t>Introduction to matrices</a:t>
+              <a:t>Creating matrices</a:t>
             </a:r>
           </a:p>
         </p:txBody>
@@ -4624,37 +5438,103 @@
           <a:lstStyle/>
           <a:p>
             <a:r>
+              <a:rPr lang="en-GB" sz="2800" dirty="0"/>
+              <a:t>Create a matrix from known values</a:t>
+            </a:r>
+          </a:p>
+          <a:p>
+            <a:pPr lvl="1"/>
+            <a:r>
               <a:rPr lang="en-GB" dirty="0"/>
-              <a:t>Matrix operations</a:t>
+              <a:t>Comma-separate items on the same row</a:t>
             </a:r>
           </a:p>
           <a:p>
             <a:pPr lvl="1"/>
             <a:r>
               <a:rPr lang="en-GB" dirty="0"/>
-              <a:t>Start by adding a single value to a matrix</a:t>
+              <a:t>Semicolon-separate rows</a:t>
             </a:r>
           </a:p>
           <a:p>
             <a:pPr lvl="1"/>
+            <a:endParaRPr lang="en-GB" sz="1200" dirty="0"/>
+          </a:p>
+          <a:p>
             <a:r>
               <a:rPr lang="en-GB" dirty="0"/>
-              <a:t>Add two matrices together</a:t>
+              <a:t>A single row matrix</a:t>
             </a:r>
           </a:p>
           <a:p>
             <a:pPr lvl="1"/>
             <a:r>
               <a:rPr lang="en-GB" dirty="0"/>
-              <a:t>Talk about the element-wise dot (e.g. .*)</a:t>
-            </a:r>
+              <a:t>new_mat_1 = [32,-12,7];</a:t>
+            </a:r>
+          </a:p>
+          <a:p>
+            <a:pPr lvl="1"/>
+            <a:endParaRPr lang="en-GB" sz="1200" dirty="0"/>
+          </a:p>
+          <a:p>
+            <a:r>
+              <a:rPr lang="en-GB" dirty="0"/>
+              <a:t>A single column matrix</a:t>
+            </a:r>
+          </a:p>
+          <a:p>
+            <a:pPr lvl="1"/>
+            <a:r>
+              <a:rPr lang="en-GB" dirty="0"/>
+              <a:t>new_mat_2 = [1;2;3];</a:t>
+            </a:r>
+          </a:p>
+          <a:p>
+            <a:pPr lvl="1"/>
+            <a:endParaRPr lang="en-GB" dirty="0"/>
+          </a:p>
+          <a:p>
+            <a:pPr marL="0" indent="0">
+              <a:buNone/>
+            </a:pPr>
+            <a:endParaRPr lang="en-GB" sz="2800" dirty="0"/>
           </a:p>
         </p:txBody>
       </p:sp>
+      <p:pic>
+        <p:nvPicPr>
+          <p:cNvPr id="4" name="Picture 3">
+            <a:extLst>
+              <a:ext uri="{FF2B5EF4-FFF2-40B4-BE49-F238E27FC236}">
+                <a16:creationId xmlns:a16="http://schemas.microsoft.com/office/drawing/2014/main" id="{4EA86319-D018-46CB-AD76-83A2E71A4E79}"/>
+              </a:ext>
+            </a:extLst>
+          </p:cNvPr>
+          <p:cNvPicPr>
+            <a:picLocks noChangeAspect="1"/>
+          </p:cNvPicPr>
+          <p:nvPr/>
+        </p:nvPicPr>
+        <p:blipFill rotWithShape="1">
+          <a:blip r:embed="rId2"/>
+          <a:srcRect l="29862" t="8440" r="48533" b="59266"/>
+          <a:stretch/>
+        </p:blipFill>
+        <p:spPr>
+          <a:xfrm>
+            <a:off x="7140591" y="2554112"/>
+            <a:ext cx="2634143" cy="2214694"/>
+          </a:xfrm>
+          <a:prstGeom prst="rect">
+            <a:avLst/>
+          </a:prstGeom>
+        </p:spPr>
+      </p:pic>
     </p:spTree>
     <p:extLst>
       <p:ext uri="{BB962C8B-B14F-4D97-AF65-F5344CB8AC3E}">
-        <p14:creationId xmlns:p14="http://schemas.microsoft.com/office/powerpoint/2010/main" val="909048802"/>
+        <p14:creationId xmlns:p14="http://schemas.microsoft.com/office/powerpoint/2010/main" val="460338814"/>
       </p:ext>
     </p:extLst>
   </p:cSld>
@@ -4704,7 +5584,7 @@
           <a:p>
             <a:r>
               <a:rPr lang="en-GB" dirty="0"/>
-              <a:t>Initialising variables</a:t>
+              <a:t>Creating matrices</a:t>
             </a:r>
           </a:p>
         </p:txBody>
@@ -4732,43 +5612,27 @@
           <a:p>
             <a:r>
               <a:rPr lang="en-GB" dirty="0"/>
-              <a:t>Why and how?</a:t>
-            </a:r>
+              <a:t>Initialising an empty matrix</a:t>
+            </a:r>
+          </a:p>
+          <a:p>
+            <a:pPr marL="0" indent="0">
+              <a:buNone/>
+            </a:pPr>
+            <a:endParaRPr lang="en-GB" dirty="0"/>
           </a:p>
           <a:p>
             <a:r>
               <a:rPr lang="en-GB" dirty="0"/>
-              <a:t>Demo of creating a matrix</a:t>
-            </a:r>
-          </a:p>
-          <a:p>
-            <a:pPr lvl="1"/>
-            <a:r>
-              <a:rPr lang="en-GB" dirty="0"/>
-              <a:t>Non-initialised</a:t>
-            </a:r>
-          </a:p>
-          <a:p>
-            <a:pPr lvl="1"/>
-            <a:r>
-              <a:rPr lang="en-GB" dirty="0"/>
-              <a:t>Initialised</a:t>
-            </a:r>
-          </a:p>
-          <a:p>
-            <a:pPr lvl="1"/>
-            <a:endParaRPr lang="en-GB" dirty="0"/>
-          </a:p>
-          <a:p>
-            <a:pPr lvl="1"/>
-            <a:endParaRPr lang="en-GB" dirty="0"/>
+              <a:t>Matrices can be re-sized, but this is SLOW</a:t>
+            </a:r>
           </a:p>
         </p:txBody>
       </p:sp>
     </p:spTree>
     <p:extLst>
       <p:ext uri="{BB962C8B-B14F-4D97-AF65-F5344CB8AC3E}">
-        <p14:creationId xmlns:p14="http://schemas.microsoft.com/office/powerpoint/2010/main" val="1466587016"/>
+        <p14:creationId xmlns:p14="http://schemas.microsoft.com/office/powerpoint/2010/main" val="2138320475"/>
       </p:ext>
     </p:extLst>
   </p:cSld>

</xml_diff>